<commit_message>
HTML page number update
</commit_message>
<xml_diff>
--- a/HTML.pptx
+++ b/HTML.pptx
@@ -5,7 +5,7 @@
     <p:sldMasterId id="2147483648" r:id="rId1"/>
   </p:sldMasterIdLst>
   <p:notesMasterIdLst>
-    <p:notesMasterId r:id="rId17"/>
+    <p:notesMasterId r:id="rId16"/>
   </p:notesMasterIdLst>
   <p:sldIdLst>
     <p:sldId id="256" r:id="rId2"/>
@@ -20,9 +20,8 @@
     <p:sldId id="264" r:id="rId11"/>
     <p:sldId id="265" r:id="rId12"/>
     <p:sldId id="266" r:id="rId13"/>
-    <p:sldId id="267" r:id="rId14"/>
-    <p:sldId id="268" r:id="rId15"/>
-    <p:sldId id="270" r:id="rId16"/>
+    <p:sldId id="268" r:id="rId14"/>
+    <p:sldId id="270" r:id="rId15"/>
   </p:sldIdLst>
   <p:sldSz cx="12192000" cy="6858000"/>
   <p:notesSz cx="6858000" cy="9144000"/>
@@ -3104,7 +3103,7 @@
           <a:p>
             <a:fld id="{2AB0866F-FD18-4D37-8ABB-8E66477D70AB}" type="datetimeFigureOut">
               <a:rPr lang="en-US" smtClean="0"/>
-              <a:t>19-Oct-25</a:t>
+              <a:t>05-Nov-25</a:t>
             </a:fld>
             <a:endParaRPr lang="en-US"/>
           </a:p>
@@ -3600,9 +3599,9 @@
           <a:bodyPr/>
           <a:lstStyle/>
           <a:p>
-            <a:fld id="{89B6CC71-1C52-4B79-8C00-E51A2E74A3D9}" type="datetimeFigureOut">
+            <a:fld id="{C52EF133-8968-4CE7-9F0C-BF53EEA45D0F}" type="datetime1">
               <a:rPr lang="en-US" smtClean="0"/>
-              <a:t>19-Oct-25</a:t>
+              <a:t>05-Nov-25</a:t>
             </a:fld>
             <a:endParaRPr lang="en-US"/>
           </a:p>
@@ -3798,9 +3797,9 @@
           <a:bodyPr/>
           <a:lstStyle/>
           <a:p>
-            <a:fld id="{89B6CC71-1C52-4B79-8C00-E51A2E74A3D9}" type="datetimeFigureOut">
+            <a:fld id="{7BC681D9-13D8-4972-A4F6-2E1C278BB364}" type="datetime1">
               <a:rPr lang="en-US" smtClean="0"/>
-              <a:t>19-Oct-25</a:t>
+              <a:t>05-Nov-25</a:t>
             </a:fld>
             <a:endParaRPr lang="en-US"/>
           </a:p>
@@ -4006,9 +4005,9 @@
           <a:bodyPr/>
           <a:lstStyle/>
           <a:p>
-            <a:fld id="{89B6CC71-1C52-4B79-8C00-E51A2E74A3D9}" type="datetimeFigureOut">
+            <a:fld id="{53EB8E7B-6875-4693-B915-181EC981E5B1}" type="datetime1">
               <a:rPr lang="en-US" smtClean="0"/>
-              <a:t>19-Oct-25</a:t>
+              <a:t>05-Nov-25</a:t>
             </a:fld>
             <a:endParaRPr lang="en-US"/>
           </a:p>
@@ -4204,9 +4203,9 @@
           <a:bodyPr/>
           <a:lstStyle/>
           <a:p>
-            <a:fld id="{89B6CC71-1C52-4B79-8C00-E51A2E74A3D9}" type="datetimeFigureOut">
+            <a:fld id="{05EE7B56-0236-46F6-BAF8-B3F94A82FC27}" type="datetime1">
               <a:rPr lang="en-US" smtClean="0"/>
-              <a:t>19-Oct-25</a:t>
+              <a:t>05-Nov-25</a:t>
             </a:fld>
             <a:endParaRPr lang="en-US"/>
           </a:p>
@@ -4256,13 +4255,18 @@
         <p:spPr/>
         <p:txBody>
           <a:bodyPr/>
-          <a:lstStyle/>
+          <a:lstStyle>
+            <a:lvl1pPr>
+              <a:defRPr sz="2800"/>
+            </a:lvl1pPr>
+          </a:lstStyle>
           <a:p>
             <a:fld id="{55206F03-2227-42F5-B928-747E3D86FF23}" type="slidenum">
               <a:rPr lang="en-US" smtClean="0"/>
+              <a:pPr/>
               <a:t>‹#›</a:t>
             </a:fld>
-            <a:endParaRPr lang="en-US"/>
+            <a:endParaRPr lang="en-US" sz="2800" dirty="0"/>
           </a:p>
         </p:txBody>
       </p:sp>
@@ -4479,9 +4483,9 @@
           <a:bodyPr/>
           <a:lstStyle/>
           <a:p>
-            <a:fld id="{89B6CC71-1C52-4B79-8C00-E51A2E74A3D9}" type="datetimeFigureOut">
+            <a:fld id="{F099282E-174E-40A1-84EF-D89A9ACE9652}" type="datetime1">
               <a:rPr lang="en-US" smtClean="0"/>
-              <a:t>19-Oct-25</a:t>
+              <a:t>05-Nov-25</a:t>
             </a:fld>
             <a:endParaRPr lang="en-US"/>
           </a:p>
@@ -4744,9 +4748,9 @@
           <a:bodyPr/>
           <a:lstStyle/>
           <a:p>
-            <a:fld id="{89B6CC71-1C52-4B79-8C00-E51A2E74A3D9}" type="datetimeFigureOut">
+            <a:fld id="{0E647A79-D173-41D7-8FFB-FE741DD8673E}" type="datetime1">
               <a:rPr lang="en-US" smtClean="0"/>
-              <a:t>19-Oct-25</a:t>
+              <a:t>05-Nov-25</a:t>
             </a:fld>
             <a:endParaRPr lang="en-US"/>
           </a:p>
@@ -5156,9 +5160,9 @@
           <a:bodyPr/>
           <a:lstStyle/>
           <a:p>
-            <a:fld id="{89B6CC71-1C52-4B79-8C00-E51A2E74A3D9}" type="datetimeFigureOut">
+            <a:fld id="{171691BC-8B1A-4C0F-A930-80F9A27FCF95}" type="datetime1">
               <a:rPr lang="en-US" smtClean="0"/>
-              <a:t>19-Oct-25</a:t>
+              <a:t>05-Nov-25</a:t>
             </a:fld>
             <a:endParaRPr lang="en-US"/>
           </a:p>
@@ -5297,9 +5301,9 @@
           <a:bodyPr/>
           <a:lstStyle/>
           <a:p>
-            <a:fld id="{89B6CC71-1C52-4B79-8C00-E51A2E74A3D9}" type="datetimeFigureOut">
+            <a:fld id="{F572F1B3-C784-4DF7-90C8-FC37CC81A559}" type="datetime1">
               <a:rPr lang="en-US" smtClean="0"/>
-              <a:t>19-Oct-25</a:t>
+              <a:t>05-Nov-25</a:t>
             </a:fld>
             <a:endParaRPr lang="en-US"/>
           </a:p>
@@ -5410,9 +5414,9 @@
           <a:bodyPr/>
           <a:lstStyle/>
           <a:p>
-            <a:fld id="{89B6CC71-1C52-4B79-8C00-E51A2E74A3D9}" type="datetimeFigureOut">
+            <a:fld id="{0668C1C8-6510-440F-A927-B26932E1065F}" type="datetime1">
               <a:rPr lang="en-US" smtClean="0"/>
-              <a:t>19-Oct-25</a:t>
+              <a:t>05-Nov-25</a:t>
             </a:fld>
             <a:endParaRPr lang="en-US"/>
           </a:p>
@@ -5721,9 +5725,9 @@
           <a:bodyPr/>
           <a:lstStyle/>
           <a:p>
-            <a:fld id="{89B6CC71-1C52-4B79-8C00-E51A2E74A3D9}" type="datetimeFigureOut">
+            <a:fld id="{D7F46AD6-E530-4E4B-B0EB-A90B9528E2B0}" type="datetime1">
               <a:rPr lang="en-US" smtClean="0"/>
-              <a:t>19-Oct-25</a:t>
+              <a:t>05-Nov-25</a:t>
             </a:fld>
             <a:endParaRPr lang="en-US"/>
           </a:p>
@@ -6009,9 +6013,9 @@
           <a:bodyPr/>
           <a:lstStyle/>
           <a:p>
-            <a:fld id="{89B6CC71-1C52-4B79-8C00-E51A2E74A3D9}" type="datetimeFigureOut">
+            <a:fld id="{6B9C4C15-43AE-4DE8-8418-752F9C3DA7E9}" type="datetime1">
               <a:rPr lang="en-US" smtClean="0"/>
-              <a:t>19-Oct-25</a:t>
+              <a:t>05-Nov-25</a:t>
             </a:fld>
             <a:endParaRPr lang="en-US"/>
           </a:p>
@@ -6250,9 +6254,9 @@
             </a:lvl1pPr>
           </a:lstStyle>
           <a:p>
-            <a:fld id="{89B6CC71-1C52-4B79-8C00-E51A2E74A3D9}" type="datetimeFigureOut">
+            <a:fld id="{EAD684F5-00A2-4B7B-93E6-BA5FB0B9AEB8}" type="datetime1">
               <a:rPr lang="en-US" smtClean="0"/>
-              <a:t>19-Oct-25</a:t>
+              <a:t>05-Nov-25</a:t>
             </a:fld>
             <a:endParaRPr lang="en-US"/>
           </a:p>
@@ -6369,6 +6373,7 @@
     <p:sldLayoutId id="2147483658" r:id="rId10"/>
     <p:sldLayoutId id="2147483659" r:id="rId11"/>
   </p:sldLayoutIdLst>
+  <p:hf hdr="0" ftr="0" dt="0"/>
   <p:txStyles>
     <p:titleStyle>
       <a:lvl1pPr algn="l" defTabSz="914400" rtl="0" eaLnBrk="1" latinLnBrk="0" hangingPunct="1">
@@ -6765,7 +6770,7 @@
         </p:blipFill>
         <p:spPr>
           <a:xfrm>
-            <a:off x="20" y="10"/>
+            <a:off x="20" y="10170"/>
             <a:ext cx="12188931" cy="6857990"/>
           </a:xfrm>
           <a:prstGeom prst="rect">
@@ -7797,6 +7802,35 @@
           </a:p>
         </p:txBody>
       </p:sp>
+      <p:sp>
+        <p:nvSpPr>
+          <p:cNvPr id="6" name="Slide Number Placeholder 5">
+            <a:extLst>
+              <a:ext uri="{FF2B5EF4-FFF2-40B4-BE49-F238E27FC236}">
+                <a16:creationId xmlns:a16="http://schemas.microsoft.com/office/drawing/2014/main" id="{AD075944-6C9E-CF4D-1349-0DAAF2FAECD4}"/>
+              </a:ext>
+            </a:extLst>
+          </p:cNvPr>
+          <p:cNvSpPr>
+            <a:spLocks noGrp="1"/>
+          </p:cNvSpPr>
+          <p:nvPr>
+            <p:ph type="sldNum" sz="quarter" idx="12"/>
+          </p:nvPr>
+        </p:nvSpPr>
+        <p:spPr/>
+        <p:txBody>
+          <a:bodyPr/>
+          <a:lstStyle/>
+          <a:p>
+            <a:fld id="{55206F03-2227-42F5-B928-747E3D86FF23}" type="slidenum">
+              <a:rPr lang="en-US" sz="2800" b="1" smtClean="0"/>
+              <a:t>1</a:t>
+            </a:fld>
+            <a:endParaRPr lang="en-US" sz="2800" b="1" dirty="0"/>
+          </a:p>
+        </p:txBody>
+      </p:sp>
     </p:spTree>
     <p:extLst>
       <p:ext uri="{BB962C8B-B14F-4D97-AF65-F5344CB8AC3E}">
@@ -8938,6 +8972,35 @@
           </a:graphicData>
         </a:graphic>
       </p:graphicFrame>
+      <p:sp>
+        <p:nvSpPr>
+          <p:cNvPr id="6" name="Slide Number Placeholder 5">
+            <a:extLst>
+              <a:ext uri="{FF2B5EF4-FFF2-40B4-BE49-F238E27FC236}">
+                <a16:creationId xmlns:a16="http://schemas.microsoft.com/office/drawing/2014/main" id="{8BBE2C89-8E05-35A6-3C6D-3E68C7A945CA}"/>
+              </a:ext>
+            </a:extLst>
+          </p:cNvPr>
+          <p:cNvSpPr>
+            <a:spLocks noGrp="1"/>
+          </p:cNvSpPr>
+          <p:nvPr>
+            <p:ph type="sldNum" sz="quarter" idx="12"/>
+          </p:nvPr>
+        </p:nvSpPr>
+        <p:spPr/>
+        <p:txBody>
+          <a:bodyPr/>
+          <a:lstStyle/>
+          <a:p>
+            <a:fld id="{55206F03-2227-42F5-B928-747E3D86FF23}" type="slidenum">
+              <a:rPr lang="en-US" smtClean="0"/>
+              <a:t>10</a:t>
+            </a:fld>
+            <a:endParaRPr lang="en-US"/>
+          </a:p>
+        </p:txBody>
+      </p:sp>
     </p:spTree>
     <p:extLst>
       <p:ext uri="{BB962C8B-B14F-4D97-AF65-F5344CB8AC3E}">
@@ -9990,6 +10053,35 @@
           </a:graphicData>
         </a:graphic>
       </p:graphicFrame>
+      <p:sp>
+        <p:nvSpPr>
+          <p:cNvPr id="6" name="Slide Number Placeholder 5">
+            <a:extLst>
+              <a:ext uri="{FF2B5EF4-FFF2-40B4-BE49-F238E27FC236}">
+                <a16:creationId xmlns:a16="http://schemas.microsoft.com/office/drawing/2014/main" id="{0DB55502-E658-CA73-9261-84CC37BC0F62}"/>
+              </a:ext>
+            </a:extLst>
+          </p:cNvPr>
+          <p:cNvSpPr>
+            <a:spLocks noGrp="1"/>
+          </p:cNvSpPr>
+          <p:nvPr>
+            <p:ph type="sldNum" sz="quarter" idx="12"/>
+          </p:nvPr>
+        </p:nvSpPr>
+        <p:spPr/>
+        <p:txBody>
+          <a:bodyPr/>
+          <a:lstStyle/>
+          <a:p>
+            <a:fld id="{55206F03-2227-42F5-B928-747E3D86FF23}" type="slidenum">
+              <a:rPr lang="en-US" smtClean="0"/>
+              <a:t>11</a:t>
+            </a:fld>
+            <a:endParaRPr lang="en-US"/>
+          </a:p>
+        </p:txBody>
+      </p:sp>
     </p:spTree>
     <p:extLst>
       <p:ext uri="{BB962C8B-B14F-4D97-AF65-F5344CB8AC3E}">
@@ -10911,6 +11003,35 @@
           </a:graphicData>
         </a:graphic>
       </p:graphicFrame>
+      <p:sp>
+        <p:nvSpPr>
+          <p:cNvPr id="6" name="Slide Number Placeholder 5">
+            <a:extLst>
+              <a:ext uri="{FF2B5EF4-FFF2-40B4-BE49-F238E27FC236}">
+                <a16:creationId xmlns:a16="http://schemas.microsoft.com/office/drawing/2014/main" id="{34D75912-5CE9-22BD-0FCE-A6B431C0EA60}"/>
+              </a:ext>
+            </a:extLst>
+          </p:cNvPr>
+          <p:cNvSpPr>
+            <a:spLocks noGrp="1"/>
+          </p:cNvSpPr>
+          <p:nvPr>
+            <p:ph type="sldNum" sz="quarter" idx="12"/>
+          </p:nvPr>
+        </p:nvSpPr>
+        <p:spPr/>
+        <p:txBody>
+          <a:bodyPr/>
+          <a:lstStyle/>
+          <a:p>
+            <a:fld id="{55206F03-2227-42F5-B928-747E3D86FF23}" type="slidenum">
+              <a:rPr lang="en-US" smtClean="0"/>
+              <a:t>12</a:t>
+            </a:fld>
+            <a:endParaRPr lang="en-US"/>
+          </a:p>
+        </p:txBody>
+      </p:sp>
     </p:spTree>
     <p:extLst>
       <p:ext uri="{BB962C8B-B14F-4D97-AF65-F5344CB8AC3E}">
@@ -10940,7 +11061,7 @@
         <p:cNvPr id="1" name="">
           <a:extLst>
             <a:ext uri="{FF2B5EF4-FFF2-40B4-BE49-F238E27FC236}">
-              <a16:creationId xmlns:a16="http://schemas.microsoft.com/office/drawing/2014/main" id="{1BDC9740-4788-61E6-D735-2751FC9B68FA}"/>
+              <a16:creationId xmlns:a16="http://schemas.microsoft.com/office/drawing/2014/main" id="{CFFCD09D-9918-8F04-20D4-C986F8DEFACC}"/>
             </a:ext>
           </a:extLst>
         </p:cNvPr>
@@ -11433,7 +11554,7 @@
           <p:cNvPr id="2" name="Title 1">
             <a:extLst>
               <a:ext uri="{FF2B5EF4-FFF2-40B4-BE49-F238E27FC236}">
-                <a16:creationId xmlns:a16="http://schemas.microsoft.com/office/drawing/2014/main" id="{AEF65D85-2877-8C89-FC44-450C68ABBF1E}"/>
+                <a16:creationId xmlns:a16="http://schemas.microsoft.com/office/drawing/2014/main" id="{DE5B2143-FFD0-D5D3-5DC5-110019B2F4FC}"/>
               </a:ext>
             </a:extLst>
           </p:cNvPr>
@@ -11457,6 +11578,14 @@
           <a:lstStyle/>
           <a:p>
             <a:r>
+              <a:rPr lang="en-US" sz="4000" b="1" dirty="0">
+                <a:solidFill>
+                  <a:srgbClr val="FFFFFF"/>
+                </a:solidFill>
+              </a:rPr>
+              <a:t>8</a:t>
+            </a:r>
+            <a:r>
               <a:rPr lang="en-US" sz="4000" b="1" kern="1200" dirty="0">
                 <a:solidFill>
                   <a:srgbClr val="FFFFFF"/>
@@ -11465,937 +11594,9 @@
                 <a:ea typeface="+mj-ea"/>
                 <a:cs typeface="+mj-cs"/>
               </a:rPr>
-              <a:t>8. </a:t>
+              <a:t>. Empty (Void)</a:t>
             </a:r>
-            <a:r>
-              <a:rPr lang="en-US" sz="4000" b="1" dirty="0">
-                <a:solidFill>
-                  <a:schemeClr val="bg1"/>
-                </a:solidFill>
-              </a:rPr>
-              <a:t>Media Tags</a:t>
-            </a:r>
-            <a:br>
-              <a:rPr lang="en-US" sz="4000" b="1" kern="1200" dirty="0">
-                <a:solidFill>
-                  <a:srgbClr val="FFFFFF"/>
-                </a:solidFill>
-                <a:latin typeface="+mj-lt"/>
-                <a:ea typeface="+mj-ea"/>
-                <a:cs typeface="+mj-cs"/>
-              </a:rPr>
-            </a:br>
             <a:endParaRPr lang="en-US" sz="4000" kern="1200" dirty="0">
-              <a:solidFill>
-                <a:srgbClr val="FFFFFF"/>
-              </a:solidFill>
-              <a:latin typeface="+mj-lt"/>
-              <a:ea typeface="+mj-ea"/>
-              <a:cs typeface="+mj-cs"/>
-            </a:endParaRPr>
-          </a:p>
-        </p:txBody>
-      </p:sp>
-      <p:graphicFrame>
-        <p:nvGraphicFramePr>
-          <p:cNvPr id="3" name="Table 2">
-            <a:extLst>
-              <a:ext uri="{FF2B5EF4-FFF2-40B4-BE49-F238E27FC236}">
-                <a16:creationId xmlns:a16="http://schemas.microsoft.com/office/drawing/2014/main" id="{B9B2091D-115D-69FE-A00F-835C37C28B8D}"/>
-              </a:ext>
-            </a:extLst>
-          </p:cNvPr>
-          <p:cNvGraphicFramePr>
-            <a:graphicFrameLocks noGrp="1"/>
-          </p:cNvGraphicFramePr>
-          <p:nvPr>
-            <p:extLst>
-              <p:ext uri="{D42A27DB-BD31-4B8C-83A1-F6EECF244321}">
-                <p14:modId xmlns:p14="http://schemas.microsoft.com/office/powerpoint/2010/main" val="4252457656"/>
-              </p:ext>
-            </p:extLst>
-          </p:nvPr>
-        </p:nvGraphicFramePr>
-        <p:xfrm>
-          <a:off x="4601042" y="478712"/>
-          <a:ext cx="7275998" cy="5533865"/>
-        </p:xfrm>
-        <a:graphic>
-          <a:graphicData uri="http://schemas.openxmlformats.org/drawingml/2006/table">
-            <a:tbl>
-              <a:tblPr firstRow="1" bandRow="1">
-                <a:tableStyleId>{5C22544A-7EE6-4342-B048-85BDC9FD1C3A}</a:tableStyleId>
-              </a:tblPr>
-              <a:tblGrid>
-                <a:gridCol w="3637999">
-                  <a:extLst>
-                    <a:ext uri="{9D8B030D-6E8A-4147-A177-3AD203B41FA5}">
-                      <a16:colId xmlns:a16="http://schemas.microsoft.com/office/drawing/2014/main" val="3508069695"/>
-                    </a:ext>
-                  </a:extLst>
-                </a:gridCol>
-                <a:gridCol w="3637999">
-                  <a:extLst>
-                    <a:ext uri="{9D8B030D-6E8A-4147-A177-3AD203B41FA5}">
-                      <a16:colId xmlns:a16="http://schemas.microsoft.com/office/drawing/2014/main" val="3980755984"/>
-                    </a:ext>
-                  </a:extLst>
-                </a:gridCol>
-              </a:tblGrid>
-              <a:tr h="651043">
-                <a:tc>
-                  <a:txBody>
-                    <a:bodyPr/>
-                    <a:lstStyle/>
-                    <a:p>
-                      <a:pPr>
-                        <a:buNone/>
-                      </a:pPr>
-                      <a:r>
-                        <a:rPr lang="en-US" b="1" dirty="0"/>
-                        <a:t>Tag</a:t>
-                      </a:r>
-                      <a:endParaRPr lang="en-US" dirty="0"/>
-                    </a:p>
-                  </a:txBody>
-                  <a:tcPr anchor="ctr"/>
-                </a:tc>
-                <a:tc>
-                  <a:txBody>
-                    <a:bodyPr/>
-                    <a:lstStyle/>
-                    <a:p>
-                      <a:pPr>
-                        <a:buNone/>
-                      </a:pPr>
-                      <a:r>
-                        <a:rPr lang="en-US" b="1"/>
-                        <a:t>Purpose</a:t>
-                      </a:r>
-                      <a:endParaRPr lang="en-US"/>
-                    </a:p>
-                  </a:txBody>
-                  <a:tcPr anchor="ctr"/>
-                </a:tc>
-                <a:extLst>
-                  <a:ext uri="{0D108BD9-81ED-4DB2-BD59-A6C34878D82A}">
-                    <a16:rowId xmlns:a16="http://schemas.microsoft.com/office/drawing/2014/main" val="1091244911"/>
-                  </a:ext>
-                </a:extLst>
-              </a:tr>
-              <a:tr h="651043">
-                <a:tc>
-                  <a:txBody>
-                    <a:bodyPr/>
-                    <a:lstStyle/>
-                    <a:p>
-                      <a:pPr>
-                        <a:buNone/>
-                      </a:pPr>
-                      <a:r>
-                        <a:rPr lang="en-US">
-                          <a:latin typeface="Courier New" panose="02070309020205020404" pitchFamily="49" charset="0"/>
-                        </a:rPr>
-                        <a:t>&lt;img&gt;</a:t>
-                      </a:r>
-                      <a:endParaRPr lang="en-US"/>
-                    </a:p>
-                  </a:txBody>
-                  <a:tcPr anchor="ctr"/>
-                </a:tc>
-                <a:tc>
-                  <a:txBody>
-                    <a:bodyPr/>
-                    <a:lstStyle/>
-                    <a:p>
-                      <a:pPr>
-                        <a:buNone/>
-                      </a:pPr>
-                      <a:r>
-                        <a:rPr lang="en-US"/>
-                        <a:t>Embeds an image</a:t>
-                      </a:r>
-                    </a:p>
-                  </a:txBody>
-                  <a:tcPr anchor="ctr"/>
-                </a:tc>
-                <a:extLst>
-                  <a:ext uri="{0D108BD9-81ED-4DB2-BD59-A6C34878D82A}">
-                    <a16:rowId xmlns:a16="http://schemas.microsoft.com/office/drawing/2014/main" val="1542507193"/>
-                  </a:ext>
-                </a:extLst>
-              </a:tr>
-              <a:tr h="651043">
-                <a:tc>
-                  <a:txBody>
-                    <a:bodyPr/>
-                    <a:lstStyle/>
-                    <a:p>
-                      <a:pPr>
-                        <a:buNone/>
-                      </a:pPr>
-                      <a:r>
-                        <a:rPr lang="en-US">
-                          <a:latin typeface="Courier New" panose="02070309020205020404" pitchFamily="49" charset="0"/>
-                        </a:rPr>
-                        <a:t>&lt;audio&gt;</a:t>
-                      </a:r>
-                      <a:endParaRPr lang="en-US"/>
-                    </a:p>
-                  </a:txBody>
-                  <a:tcPr anchor="ctr"/>
-                </a:tc>
-                <a:tc>
-                  <a:txBody>
-                    <a:bodyPr/>
-                    <a:lstStyle/>
-                    <a:p>
-                      <a:pPr>
-                        <a:buNone/>
-                      </a:pPr>
-                      <a:r>
-                        <a:rPr lang="en-US"/>
-                        <a:t>Embeds audio content</a:t>
-                      </a:r>
-                    </a:p>
-                  </a:txBody>
-                  <a:tcPr anchor="ctr"/>
-                </a:tc>
-                <a:extLst>
-                  <a:ext uri="{0D108BD9-81ED-4DB2-BD59-A6C34878D82A}">
-                    <a16:rowId xmlns:a16="http://schemas.microsoft.com/office/drawing/2014/main" val="3535769532"/>
-                  </a:ext>
-                </a:extLst>
-              </a:tr>
-              <a:tr h="651043">
-                <a:tc>
-                  <a:txBody>
-                    <a:bodyPr/>
-                    <a:lstStyle/>
-                    <a:p>
-                      <a:pPr>
-                        <a:buNone/>
-                      </a:pPr>
-                      <a:r>
-                        <a:rPr lang="en-US">
-                          <a:latin typeface="Courier New" panose="02070309020205020404" pitchFamily="49" charset="0"/>
-                        </a:rPr>
-                        <a:t>&lt;video&gt;</a:t>
-                      </a:r>
-                      <a:endParaRPr lang="en-US"/>
-                    </a:p>
-                  </a:txBody>
-                  <a:tcPr anchor="ctr"/>
-                </a:tc>
-                <a:tc>
-                  <a:txBody>
-                    <a:bodyPr/>
-                    <a:lstStyle/>
-                    <a:p>
-                      <a:pPr>
-                        <a:buNone/>
-                      </a:pPr>
-                      <a:r>
-                        <a:rPr lang="en-US"/>
-                        <a:t>Embeds video content</a:t>
-                      </a:r>
-                    </a:p>
-                  </a:txBody>
-                  <a:tcPr anchor="ctr"/>
-                </a:tc>
-                <a:extLst>
-                  <a:ext uri="{0D108BD9-81ED-4DB2-BD59-A6C34878D82A}">
-                    <a16:rowId xmlns:a16="http://schemas.microsoft.com/office/drawing/2014/main" val="1024781742"/>
-                  </a:ext>
-                </a:extLst>
-              </a:tr>
-              <a:tr h="651043">
-                <a:tc>
-                  <a:txBody>
-                    <a:bodyPr/>
-                    <a:lstStyle/>
-                    <a:p>
-                      <a:pPr>
-                        <a:buNone/>
-                      </a:pPr>
-                      <a:r>
-                        <a:rPr lang="en-US">
-                          <a:latin typeface="Courier New" panose="02070309020205020404" pitchFamily="49" charset="0"/>
-                        </a:rPr>
-                        <a:t>&lt;source&gt;</a:t>
-                      </a:r>
-                      <a:endParaRPr lang="en-US"/>
-                    </a:p>
-                  </a:txBody>
-                  <a:tcPr anchor="ctr"/>
-                </a:tc>
-                <a:tc>
-                  <a:txBody>
-                    <a:bodyPr/>
-                    <a:lstStyle/>
-                    <a:p>
-                      <a:pPr>
-                        <a:buNone/>
-                      </a:pPr>
-                      <a:r>
-                        <a:rPr lang="en-US"/>
-                        <a:t>Specifies multiple media sources</a:t>
-                      </a:r>
-                    </a:p>
-                  </a:txBody>
-                  <a:tcPr anchor="ctr"/>
-                </a:tc>
-                <a:extLst>
-                  <a:ext uri="{0D108BD9-81ED-4DB2-BD59-A6C34878D82A}">
-                    <a16:rowId xmlns:a16="http://schemas.microsoft.com/office/drawing/2014/main" val="3332010484"/>
-                  </a:ext>
-                </a:extLst>
-              </a:tr>
-              <a:tr h="1139325">
-                <a:tc>
-                  <a:txBody>
-                    <a:bodyPr/>
-                    <a:lstStyle/>
-                    <a:p>
-                      <a:pPr>
-                        <a:buNone/>
-                      </a:pPr>
-                      <a:r>
-                        <a:rPr lang="en-US">
-                          <a:latin typeface="Courier New" panose="02070309020205020404" pitchFamily="49" charset="0"/>
-                        </a:rPr>
-                        <a:t>&lt;track&gt;</a:t>
-                      </a:r>
-                      <a:endParaRPr lang="en-US"/>
-                    </a:p>
-                  </a:txBody>
-                  <a:tcPr anchor="ctr"/>
-                </a:tc>
-                <a:tc>
-                  <a:txBody>
-                    <a:bodyPr/>
-                    <a:lstStyle/>
-                    <a:p>
-                      <a:pPr>
-                        <a:buNone/>
-                      </a:pPr>
-                      <a:r>
-                        <a:rPr lang="en-US"/>
-                        <a:t>Adds subtitles or captions to media</a:t>
-                      </a:r>
-                    </a:p>
-                  </a:txBody>
-                  <a:tcPr anchor="ctr"/>
-                </a:tc>
-                <a:extLst>
-                  <a:ext uri="{0D108BD9-81ED-4DB2-BD59-A6C34878D82A}">
-                    <a16:rowId xmlns:a16="http://schemas.microsoft.com/office/drawing/2014/main" val="1474954470"/>
-                  </a:ext>
-                </a:extLst>
-              </a:tr>
-              <a:tr h="1139325">
-                <a:tc>
-                  <a:txBody>
-                    <a:bodyPr/>
-                    <a:lstStyle/>
-                    <a:p>
-                      <a:pPr>
-                        <a:buNone/>
-                      </a:pPr>
-                      <a:r>
-                        <a:rPr lang="en-US">
-                          <a:latin typeface="Courier New" panose="02070309020205020404" pitchFamily="49" charset="0"/>
-                        </a:rPr>
-                        <a:t>&lt;iframe&gt;</a:t>
-                      </a:r>
-                      <a:endParaRPr lang="en-US"/>
-                    </a:p>
-                  </a:txBody>
-                  <a:tcPr anchor="ctr"/>
-                </a:tc>
-                <a:tc>
-                  <a:txBody>
-                    <a:bodyPr/>
-                    <a:lstStyle/>
-                    <a:p>
-                      <a:pPr>
-                        <a:buNone/>
-                      </a:pPr>
-                      <a:r>
-                        <a:rPr lang="en-US" dirty="0"/>
-                        <a:t>Embeds another HTML page (like a video or map)</a:t>
-                      </a:r>
-                    </a:p>
-                  </a:txBody>
-                  <a:tcPr anchor="ctr"/>
-                </a:tc>
-                <a:extLst>
-                  <a:ext uri="{0D108BD9-81ED-4DB2-BD59-A6C34878D82A}">
-                    <a16:rowId xmlns:a16="http://schemas.microsoft.com/office/drawing/2014/main" val="3419497092"/>
-                  </a:ext>
-                </a:extLst>
-              </a:tr>
-            </a:tbl>
-          </a:graphicData>
-        </a:graphic>
-      </p:graphicFrame>
-    </p:spTree>
-    <p:extLst>
-      <p:ext uri="{BB962C8B-B14F-4D97-AF65-F5344CB8AC3E}">
-        <p14:creationId xmlns:p14="http://schemas.microsoft.com/office/powerpoint/2010/main" val="467737630"/>
-      </p:ext>
-    </p:extLst>
-  </p:cSld>
-  <p:clrMapOvr>
-    <a:masterClrMapping/>
-  </p:clrMapOvr>
-</p:sld>
-</file>
-
-<file path=ppt/slides/slide14.xml><?xml version="1.0" encoding="utf-8"?>
-<p:sld xmlns:a="http://schemas.openxmlformats.org/drawingml/2006/main" xmlns:r="http://schemas.openxmlformats.org/officeDocument/2006/relationships" xmlns:p="http://schemas.openxmlformats.org/presentationml/2006/main">
-  <p:cSld>
-    <p:bg>
-      <p:bgPr>
-        <a:solidFill>
-          <a:schemeClr val="bg1"/>
-        </a:solidFill>
-        <a:effectLst/>
-      </p:bgPr>
-    </p:bg>
-    <p:spTree>
-      <p:nvGrpSpPr>
-        <p:cNvPr id="1" name="">
-          <a:extLst>
-            <a:ext uri="{FF2B5EF4-FFF2-40B4-BE49-F238E27FC236}">
-              <a16:creationId xmlns:a16="http://schemas.microsoft.com/office/drawing/2014/main" id="{CFFCD09D-9918-8F04-20D4-C986F8DEFACC}"/>
-            </a:ext>
-          </a:extLst>
-        </p:cNvPr>
-        <p:cNvGrpSpPr/>
-        <p:nvPr/>
-      </p:nvGrpSpPr>
-      <p:grpSpPr>
-        <a:xfrm>
-          <a:off x="0" y="0"/>
-          <a:ext cx="0" cy="0"/>
-          <a:chOff x="0" y="0"/>
-          <a:chExt cx="0" cy="0"/>
-        </a:xfrm>
-      </p:grpSpPr>
-      <p:sp useBgFill="1">
-        <p:nvSpPr>
-          <p:cNvPr id="22" name="Rectangle 21">
-            <a:extLst>
-              <a:ext uri="{FF2B5EF4-FFF2-40B4-BE49-F238E27FC236}">
-                <a16:creationId xmlns:a16="http://schemas.microsoft.com/office/drawing/2014/main" id="{A8384FB5-9ADC-4DDC-881B-597D56F5B15D}"/>
-              </a:ext>
-              <a:ext uri="{C183D7F6-B498-43B3-948B-1728B52AA6E4}">
-                <adec:decorative xmlns:adec="http://schemas.microsoft.com/office/drawing/2017/decorative" val="1"/>
-              </a:ext>
-            </a:extLst>
-          </p:cNvPr>
-          <p:cNvSpPr>
-            <a:spLocks noGrp="1" noRot="1" noChangeAspect="1" noMove="1" noResize="1" noEditPoints="1" noAdjustHandles="1" noChangeArrowheads="1" noChangeShapeType="1" noTextEdit="1"/>
-          </p:cNvSpPr>
-          <p:nvPr>
-            <p:extLst>
-              <p:ext uri="{386F3935-93C4-4BCD-93E2-E3B085C9AB24}">
-                <p16:designElem xmlns:p16="http://schemas.microsoft.com/office/powerpoint/2015/main" val="1"/>
-              </p:ext>
-            </p:extLst>
-          </p:nvPr>
-        </p:nvSpPr>
-        <p:spPr>
-          <a:xfrm>
-            <a:off x="0" y="0"/>
-            <a:ext cx="12192000" cy="6858000"/>
-          </a:xfrm>
-          <a:prstGeom prst="rect">
-            <a:avLst/>
-          </a:prstGeom>
-          <a:ln w="12700" cap="flat" cmpd="sng" algn="ctr">
-            <a:noFill/>
-            <a:prstDash val="solid"/>
-            <a:miter lim="800000"/>
-          </a:ln>
-          <a:effectLst/>
-          <a:extLst>
-            <a:ext uri="{91240B29-F687-4F45-9708-019B960494DF}">
-              <a14:hiddenLine xmlns:a14="http://schemas.microsoft.com/office/drawing/2010/main" w="12700" cap="flat" cmpd="sng" algn="ctr">
-                <a:solidFill>
-                  <a:schemeClr val="accent1">
-                    <a:shade val="50000"/>
-                  </a:schemeClr>
-                </a:solidFill>
-                <a:prstDash val="solid"/>
-                <a:miter lim="800000"/>
-              </a14:hiddenLine>
-            </a:ext>
-          </a:extLst>
-        </p:spPr>
-        <p:style>
-          <a:lnRef idx="2">
-            <a:schemeClr val="accent1">
-              <a:shade val="50000"/>
-            </a:schemeClr>
-          </a:lnRef>
-          <a:fillRef idx="1">
-            <a:schemeClr val="accent1"/>
-          </a:fillRef>
-          <a:effectRef idx="0">
-            <a:schemeClr val="accent1"/>
-          </a:effectRef>
-          <a:fontRef idx="minor">
-            <a:schemeClr val="lt1"/>
-          </a:fontRef>
-        </p:style>
-        <p:txBody>
-          <a:bodyPr rtlCol="0" anchor="ctr"/>
-          <a:lstStyle/>
-          <a:p>
-            <a:pPr algn="ctr"/>
-            <a:endParaRPr lang="en-US"/>
-          </a:p>
-        </p:txBody>
-      </p:sp>
-      <p:sp>
-        <p:nvSpPr>
-          <p:cNvPr id="24" name="Rectangle 23">
-            <a:extLst>
-              <a:ext uri="{FF2B5EF4-FFF2-40B4-BE49-F238E27FC236}">
-                <a16:creationId xmlns:a16="http://schemas.microsoft.com/office/drawing/2014/main" id="{91E5A9A7-95C6-4F4F-B00E-C82E07FE62EF}"/>
-              </a:ext>
-              <a:ext uri="{C183D7F6-B498-43B3-948B-1728B52AA6E4}">
-                <adec:decorative xmlns:adec="http://schemas.microsoft.com/office/drawing/2017/decorative" val="1"/>
-              </a:ext>
-            </a:extLst>
-          </p:cNvPr>
-          <p:cNvSpPr>
-            <a:spLocks noGrp="1" noRot="1" noChangeAspect="1" noMove="1" noResize="1" noEditPoints="1" noAdjustHandles="1" noChangeArrowheads="1" noChangeShapeType="1" noTextEdit="1"/>
-          </p:cNvSpPr>
-          <p:nvPr>
-            <p:extLst>
-              <p:ext uri="{386F3935-93C4-4BCD-93E2-E3B085C9AB24}">
-                <p16:designElem xmlns:p16="http://schemas.microsoft.com/office/powerpoint/2015/main" val="1"/>
-              </p:ext>
-            </p:extLst>
-          </p:nvPr>
-        </p:nvSpPr>
-        <p:spPr>
-          <a:xfrm rot="5400000" flipH="1">
-            <a:off x="-1417539" y="1417538"/>
-            <a:ext cx="6875818" cy="4040744"/>
-          </a:xfrm>
-          <a:prstGeom prst="rect">
-            <a:avLst/>
-          </a:prstGeom>
-          <a:gradFill>
-            <a:gsLst>
-              <a:gs pos="0">
-                <a:srgbClr val="000000"/>
-              </a:gs>
-              <a:gs pos="100000">
-                <a:schemeClr val="accent1">
-                  <a:lumMod val="75000"/>
-                </a:schemeClr>
-              </a:gs>
-            </a:gsLst>
-            <a:lin ang="18600000" scaled="0"/>
-          </a:gradFill>
-          <a:ln>
-            <a:noFill/>
-          </a:ln>
-        </p:spPr>
-        <p:style>
-          <a:lnRef idx="2">
-            <a:schemeClr val="accent1">
-              <a:shade val="50000"/>
-            </a:schemeClr>
-          </a:lnRef>
-          <a:fillRef idx="1">
-            <a:schemeClr val="accent1"/>
-          </a:fillRef>
-          <a:effectRef idx="0">
-            <a:schemeClr val="accent1"/>
-          </a:effectRef>
-          <a:fontRef idx="minor">
-            <a:schemeClr val="lt1"/>
-          </a:fontRef>
-        </p:style>
-        <p:txBody>
-          <a:bodyPr rtlCol="0" anchor="ctr"/>
-          <a:lstStyle/>
-          <a:p>
-            <a:pPr algn="ctr"/>
-            <a:endParaRPr lang="en-US" dirty="0"/>
-          </a:p>
-        </p:txBody>
-      </p:sp>
-      <p:sp>
-        <p:nvSpPr>
-          <p:cNvPr id="26" name="Rectangle 25">
-            <a:extLst>
-              <a:ext uri="{FF2B5EF4-FFF2-40B4-BE49-F238E27FC236}">
-                <a16:creationId xmlns:a16="http://schemas.microsoft.com/office/drawing/2014/main" id="{D07DD2DE-F619-49DD-B5E7-03A290FF4ED1}"/>
-              </a:ext>
-              <a:ext uri="{C183D7F6-B498-43B3-948B-1728B52AA6E4}">
-                <adec:decorative xmlns:adec="http://schemas.microsoft.com/office/drawing/2017/decorative" val="1"/>
-              </a:ext>
-            </a:extLst>
-          </p:cNvPr>
-          <p:cNvSpPr>
-            <a:spLocks noGrp="1" noRot="1" noChangeAspect="1" noMove="1" noResize="1" noEditPoints="1" noAdjustHandles="1" noChangeArrowheads="1" noChangeShapeType="1" noTextEdit="1"/>
-          </p:cNvSpPr>
-          <p:nvPr>
-            <p:extLst>
-              <p:ext uri="{386F3935-93C4-4BCD-93E2-E3B085C9AB24}">
-                <p16:designElem xmlns:p16="http://schemas.microsoft.com/office/powerpoint/2015/main" val="1"/>
-              </p:ext>
-            </p:extLst>
-          </p:nvPr>
-        </p:nvSpPr>
-        <p:spPr>
-          <a:xfrm rot="16200000">
-            <a:off x="-158495" y="2660473"/>
-            <a:ext cx="4355594" cy="4038603"/>
-          </a:xfrm>
-          <a:prstGeom prst="rect">
-            <a:avLst/>
-          </a:prstGeom>
-          <a:gradFill>
-            <a:gsLst>
-              <a:gs pos="0">
-                <a:schemeClr val="accent1">
-                  <a:alpha val="50000"/>
-                </a:schemeClr>
-              </a:gs>
-              <a:gs pos="100000">
-                <a:schemeClr val="accent1">
-                  <a:lumMod val="50000"/>
-                  <a:alpha val="0"/>
-                </a:schemeClr>
-              </a:gs>
-            </a:gsLst>
-            <a:lin ang="11400000" scaled="0"/>
-          </a:gradFill>
-          <a:ln>
-            <a:noFill/>
-          </a:ln>
-        </p:spPr>
-        <p:style>
-          <a:lnRef idx="2">
-            <a:schemeClr val="accent1">
-              <a:shade val="50000"/>
-            </a:schemeClr>
-          </a:lnRef>
-          <a:fillRef idx="1">
-            <a:schemeClr val="accent1"/>
-          </a:fillRef>
-          <a:effectRef idx="0">
-            <a:schemeClr val="accent1"/>
-          </a:effectRef>
-          <a:fontRef idx="minor">
-            <a:schemeClr val="lt1"/>
-          </a:fontRef>
-        </p:style>
-        <p:txBody>
-          <a:bodyPr rtlCol="0" anchor="ctr"/>
-          <a:lstStyle/>
-          <a:p>
-            <a:pPr algn="ctr"/>
-            <a:endParaRPr lang="en-US"/>
-          </a:p>
-        </p:txBody>
-      </p:sp>
-      <p:sp>
-        <p:nvSpPr>
-          <p:cNvPr id="28" name="Rectangle 27">
-            <a:extLst>
-              <a:ext uri="{FF2B5EF4-FFF2-40B4-BE49-F238E27FC236}">
-                <a16:creationId xmlns:a16="http://schemas.microsoft.com/office/drawing/2014/main" id="{85149191-5F60-4A28-AAFF-039F96B0F3EC}"/>
-              </a:ext>
-              <a:ext uri="{C183D7F6-B498-43B3-948B-1728B52AA6E4}">
-                <adec:decorative xmlns:adec="http://schemas.microsoft.com/office/drawing/2017/decorative" val="1"/>
-              </a:ext>
-            </a:extLst>
-          </p:cNvPr>
-          <p:cNvSpPr>
-            <a:spLocks noGrp="1" noRot="1" noChangeAspect="1" noMove="1" noResize="1" noEditPoints="1" noAdjustHandles="1" noChangeArrowheads="1" noChangeShapeType="1" noTextEdit="1"/>
-          </p:cNvSpPr>
-          <p:nvPr>
-            <p:extLst>
-              <p:ext uri="{386F3935-93C4-4BCD-93E2-E3B085C9AB24}">
-                <p16:designElem xmlns:p16="http://schemas.microsoft.com/office/powerpoint/2015/main" val="1"/>
-              </p:ext>
-            </p:extLst>
-          </p:nvPr>
-        </p:nvSpPr>
-        <p:spPr>
-          <a:xfrm rot="16200000" flipH="1">
-            <a:off x="-1180882" y="1638085"/>
-            <a:ext cx="6857572" cy="3581401"/>
-          </a:xfrm>
-          <a:prstGeom prst="rect">
-            <a:avLst/>
-          </a:prstGeom>
-          <a:gradFill>
-            <a:gsLst>
-              <a:gs pos="0">
-                <a:srgbClr val="000000">
-                  <a:alpha val="59000"/>
-                </a:srgbClr>
-              </a:gs>
-              <a:gs pos="69000">
-                <a:schemeClr val="accent1">
-                  <a:alpha val="0"/>
-                </a:schemeClr>
-              </a:gs>
-            </a:gsLst>
-            <a:lin ang="13200000" scaled="0"/>
-          </a:gradFill>
-          <a:ln>
-            <a:noFill/>
-          </a:ln>
-        </p:spPr>
-        <p:style>
-          <a:lnRef idx="2">
-            <a:schemeClr val="accent1">
-              <a:shade val="50000"/>
-            </a:schemeClr>
-          </a:lnRef>
-          <a:fillRef idx="1">
-            <a:schemeClr val="accent1"/>
-          </a:fillRef>
-          <a:effectRef idx="0">
-            <a:schemeClr val="accent1"/>
-          </a:effectRef>
-          <a:fontRef idx="minor">
-            <a:schemeClr val="lt1"/>
-          </a:fontRef>
-        </p:style>
-        <p:txBody>
-          <a:bodyPr rtlCol="0" anchor="ctr"/>
-          <a:lstStyle/>
-          <a:p>
-            <a:pPr algn="ctr"/>
-            <a:endParaRPr lang="en-US" dirty="0"/>
-          </a:p>
-        </p:txBody>
-      </p:sp>
-      <p:sp>
-        <p:nvSpPr>
-          <p:cNvPr id="30" name="Freeform: Shape 29">
-            <a:extLst>
-              <a:ext uri="{FF2B5EF4-FFF2-40B4-BE49-F238E27FC236}">
-                <a16:creationId xmlns:a16="http://schemas.microsoft.com/office/drawing/2014/main" id="{F8260ED5-17F7-4158-B241-D51DD4CF1B7E}"/>
-              </a:ext>
-              <a:ext uri="{C183D7F6-B498-43B3-948B-1728B52AA6E4}">
-                <adec:decorative xmlns:adec="http://schemas.microsoft.com/office/drawing/2017/decorative" val="1"/>
-              </a:ext>
-            </a:extLst>
-          </p:cNvPr>
-          <p:cNvSpPr>
-            <a:spLocks noGrp="1" noRot="1" noChangeAspect="1" noMove="1" noResize="1" noEditPoints="1" noAdjustHandles="1" noChangeArrowheads="1" noChangeShapeType="1" noTextEdit="1"/>
-          </p:cNvSpPr>
-          <p:nvPr>
-            <p:extLst>
-              <p:ext uri="{386F3935-93C4-4BCD-93E2-E3B085C9AB24}">
-                <p16:designElem xmlns:p16="http://schemas.microsoft.com/office/powerpoint/2015/main" val="1"/>
-              </p:ext>
-            </p:extLst>
-          </p:nvPr>
-        </p:nvSpPr>
-        <p:spPr>
-          <a:xfrm rot="6097846">
-            <a:off x="-747355" y="1201312"/>
-            <a:ext cx="4808302" cy="4088666"/>
-          </a:xfrm>
-          <a:custGeom>
-            <a:avLst/>
-            <a:gdLst>
-              <a:gd name="connsiteX0" fmla="*/ 48844 w 4808302"/>
-              <a:gd name="connsiteY0" fmla="*/ 2888671 h 4088666"/>
-              <a:gd name="connsiteX1" fmla="*/ 0 w 4808302"/>
-              <a:gd name="connsiteY1" fmla="*/ 2404151 h 4088666"/>
-              <a:gd name="connsiteX2" fmla="*/ 2404151 w 4808302"/>
-              <a:gd name="connsiteY2" fmla="*/ 0 h 4088666"/>
-              <a:gd name="connsiteX3" fmla="*/ 4808302 w 4808302"/>
-              <a:gd name="connsiteY3" fmla="*/ 2404151 h 4088666"/>
-              <a:gd name="connsiteX4" fmla="*/ 4700216 w 4808302"/>
-              <a:gd name="connsiteY4" fmla="*/ 3119072 h 4088666"/>
-              <a:gd name="connsiteX5" fmla="*/ 4643143 w 4808302"/>
-              <a:gd name="connsiteY5" fmla="*/ 3275009 h 4088666"/>
-              <a:gd name="connsiteX6" fmla="*/ 690093 w 4808302"/>
-              <a:gd name="connsiteY6" fmla="*/ 4088666 h 4088666"/>
-              <a:gd name="connsiteX7" fmla="*/ 548991 w 4808302"/>
-              <a:gd name="connsiteY7" fmla="*/ 3933414 h 4088666"/>
-              <a:gd name="connsiteX8" fmla="*/ 48844 w 4808302"/>
-              <a:gd name="connsiteY8" fmla="*/ 2888671 h 4088666"/>
-            </a:gdLst>
-            <a:ahLst/>
-            <a:cxnLst>
-              <a:cxn ang="0">
-                <a:pos x="connsiteX0" y="connsiteY0"/>
-              </a:cxn>
-              <a:cxn ang="0">
-                <a:pos x="connsiteX1" y="connsiteY1"/>
-              </a:cxn>
-              <a:cxn ang="0">
-                <a:pos x="connsiteX2" y="connsiteY2"/>
-              </a:cxn>
-              <a:cxn ang="0">
-                <a:pos x="connsiteX3" y="connsiteY3"/>
-              </a:cxn>
-              <a:cxn ang="0">
-                <a:pos x="connsiteX4" y="connsiteY4"/>
-              </a:cxn>
-              <a:cxn ang="0">
-                <a:pos x="connsiteX5" y="connsiteY5"/>
-              </a:cxn>
-              <a:cxn ang="0">
-                <a:pos x="connsiteX6" y="connsiteY6"/>
-              </a:cxn>
-              <a:cxn ang="0">
-                <a:pos x="connsiteX7" y="connsiteY7"/>
-              </a:cxn>
-              <a:cxn ang="0">
-                <a:pos x="connsiteX8" y="connsiteY8"/>
-              </a:cxn>
-            </a:cxnLst>
-            <a:rect l="l" t="t" r="r" b="b"/>
-            <a:pathLst>
-              <a:path w="4808302" h="4088666">
-                <a:moveTo>
-                  <a:pt x="48844" y="2888671"/>
-                </a:moveTo>
-                <a:cubicBezTo>
-                  <a:pt x="16818" y="2732167"/>
-                  <a:pt x="0" y="2570123"/>
-                  <a:pt x="0" y="2404151"/>
-                </a:cubicBezTo>
-                <a:cubicBezTo>
-                  <a:pt x="0" y="1076375"/>
-                  <a:pt x="1076375" y="0"/>
-                  <a:pt x="2404151" y="0"/>
-                </a:cubicBezTo>
-                <a:cubicBezTo>
-                  <a:pt x="3731927" y="0"/>
-                  <a:pt x="4808302" y="1076375"/>
-                  <a:pt x="4808302" y="2404151"/>
-                </a:cubicBezTo>
-                <a:cubicBezTo>
-                  <a:pt x="4808302" y="2653109"/>
-                  <a:pt x="4770461" y="2893229"/>
-                  <a:pt x="4700216" y="3119072"/>
-                </a:cubicBezTo>
-                <a:lnTo>
-                  <a:pt x="4643143" y="3275009"/>
-                </a:lnTo>
-                <a:lnTo>
-                  <a:pt x="690093" y="4088666"/>
-                </a:lnTo>
-                <a:lnTo>
-                  <a:pt x="548991" y="3933414"/>
-                </a:lnTo>
-                <a:cubicBezTo>
-                  <a:pt x="304015" y="3636572"/>
-                  <a:pt x="128908" y="3279932"/>
-                  <a:pt x="48844" y="2888671"/>
-                </a:cubicBezTo>
-                <a:close/>
-              </a:path>
-            </a:pathLst>
-          </a:custGeom>
-          <a:gradFill>
-            <a:gsLst>
-              <a:gs pos="39000">
-                <a:schemeClr val="accent1">
-                  <a:lumMod val="60000"/>
-                  <a:lumOff val="40000"/>
-                  <a:alpha val="0"/>
-                </a:schemeClr>
-              </a:gs>
-              <a:gs pos="100000">
-                <a:schemeClr val="accent1">
-                  <a:lumMod val="75000"/>
-                  <a:alpha val="26000"/>
-                </a:schemeClr>
-              </a:gs>
-            </a:gsLst>
-            <a:lin ang="18600000" scaled="0"/>
-          </a:gradFill>
-          <a:ln>
-            <a:noFill/>
-          </a:ln>
-        </p:spPr>
-        <p:style>
-          <a:lnRef idx="2">
-            <a:schemeClr val="accent1">
-              <a:shade val="50000"/>
-            </a:schemeClr>
-          </a:lnRef>
-          <a:fillRef idx="1">
-            <a:schemeClr val="accent1"/>
-          </a:fillRef>
-          <a:effectRef idx="0">
-            <a:schemeClr val="accent1"/>
-          </a:effectRef>
-          <a:fontRef idx="minor">
-            <a:schemeClr val="lt1"/>
-          </a:fontRef>
-        </p:style>
-        <p:txBody>
-          <a:bodyPr wrap="square" rtlCol="0" anchor="ctr">
-            <a:noAutofit/>
-          </a:bodyPr>
-          <a:lstStyle/>
-          <a:p>
-            <a:pPr algn="ctr"/>
-            <a:endParaRPr lang="en-US" dirty="0"/>
-          </a:p>
-        </p:txBody>
-      </p:sp>
-      <p:sp>
-        <p:nvSpPr>
-          <p:cNvPr id="2" name="Title 1">
-            <a:extLst>
-              <a:ext uri="{FF2B5EF4-FFF2-40B4-BE49-F238E27FC236}">
-                <a16:creationId xmlns:a16="http://schemas.microsoft.com/office/drawing/2014/main" id="{DE5B2143-FFD0-D5D3-5DC5-110019B2F4FC}"/>
-              </a:ext>
-            </a:extLst>
-          </p:cNvPr>
-          <p:cNvSpPr>
-            <a:spLocks noGrp="1"/>
-          </p:cNvSpPr>
-          <p:nvPr>
-            <p:ph type="title"/>
-          </p:nvPr>
-        </p:nvSpPr>
-        <p:spPr>
-          <a:xfrm>
-            <a:off x="660041" y="2767106"/>
-            <a:ext cx="2880828" cy="3071906"/>
-          </a:xfrm>
-        </p:spPr>
-        <p:txBody>
-          <a:bodyPr vert="horz" lIns="91440" tIns="45720" rIns="91440" bIns="45720" rtlCol="0" anchor="t">
-            <a:normAutofit/>
-          </a:bodyPr>
-          <a:lstStyle/>
-          <a:p>
-            <a:r>
-              <a:rPr lang="en-US" sz="4000" b="1" kern="1200">
-                <a:solidFill>
-                  <a:srgbClr val="FFFFFF"/>
-                </a:solidFill>
-                <a:latin typeface="+mj-lt"/>
-                <a:ea typeface="+mj-ea"/>
-                <a:cs typeface="+mj-cs"/>
-              </a:rPr>
-              <a:t>9. Empty (Void)</a:t>
-            </a:r>
-            <a:endParaRPr lang="en-US" sz="4000" kern="1200">
               <a:solidFill>
                 <a:srgbClr val="FFFFFF"/>
               </a:solidFill>
@@ -12873,6 +12074,35 @@
           </a:graphicData>
         </a:graphic>
       </p:graphicFrame>
+      <p:sp>
+        <p:nvSpPr>
+          <p:cNvPr id="6" name="Slide Number Placeholder 5">
+            <a:extLst>
+              <a:ext uri="{FF2B5EF4-FFF2-40B4-BE49-F238E27FC236}">
+                <a16:creationId xmlns:a16="http://schemas.microsoft.com/office/drawing/2014/main" id="{79A222F7-F7DA-1214-7671-4B81C2CCDDDF}"/>
+              </a:ext>
+            </a:extLst>
+          </p:cNvPr>
+          <p:cNvSpPr>
+            <a:spLocks noGrp="1"/>
+          </p:cNvSpPr>
+          <p:nvPr>
+            <p:ph type="sldNum" sz="quarter" idx="12"/>
+          </p:nvPr>
+        </p:nvSpPr>
+        <p:spPr/>
+        <p:txBody>
+          <a:bodyPr/>
+          <a:lstStyle/>
+          <a:p>
+            <a:fld id="{55206F03-2227-42F5-B928-747E3D86FF23}" type="slidenum">
+              <a:rPr lang="en-US" smtClean="0"/>
+              <a:t>13</a:t>
+            </a:fld>
+            <a:endParaRPr lang="en-US"/>
+          </a:p>
+        </p:txBody>
+      </p:sp>
     </p:spTree>
     <p:extLst>
       <p:ext uri="{BB962C8B-B14F-4D97-AF65-F5344CB8AC3E}">
@@ -12886,7 +12116,7 @@
 </p:sld>
 </file>
 
-<file path=ppt/slides/slide15.xml><?xml version="1.0" encoding="utf-8"?>
+<file path=ppt/slides/slide14.xml><?xml version="1.0" encoding="utf-8"?>
 <p:sld xmlns:a="http://schemas.openxmlformats.org/drawingml/2006/main" xmlns:r="http://schemas.openxmlformats.org/officeDocument/2006/relationships" xmlns:p="http://schemas.openxmlformats.org/presentationml/2006/main">
   <p:cSld>
     <p:bg>
@@ -13465,6 +12695,35 @@
           </a:prstGeom>
         </p:spPr>
       </p:pic>
+      <p:sp>
+        <p:nvSpPr>
+          <p:cNvPr id="5" name="Slide Number Placeholder 4">
+            <a:extLst>
+              <a:ext uri="{FF2B5EF4-FFF2-40B4-BE49-F238E27FC236}">
+                <a16:creationId xmlns:a16="http://schemas.microsoft.com/office/drawing/2014/main" id="{BFAB755A-31B3-F608-7AF5-C30377FDD945}"/>
+              </a:ext>
+            </a:extLst>
+          </p:cNvPr>
+          <p:cNvSpPr>
+            <a:spLocks noGrp="1"/>
+          </p:cNvSpPr>
+          <p:nvPr>
+            <p:ph type="sldNum" sz="quarter" idx="12"/>
+          </p:nvPr>
+        </p:nvSpPr>
+        <p:spPr/>
+        <p:txBody>
+          <a:bodyPr/>
+          <a:lstStyle/>
+          <a:p>
+            <a:fld id="{55206F03-2227-42F5-B928-747E3D86FF23}" type="slidenum">
+              <a:rPr lang="en-US" smtClean="0"/>
+              <a:t>14</a:t>
+            </a:fld>
+            <a:endParaRPr lang="en-US"/>
+          </a:p>
+        </p:txBody>
+      </p:sp>
     </p:spTree>
     <p:extLst>
       <p:ext uri="{BB962C8B-B14F-4D97-AF65-F5344CB8AC3E}">
@@ -14005,6 +13264,35 @@
           </a:graphicData>
         </a:graphic>
       </p:graphicFrame>
+      <p:sp>
+        <p:nvSpPr>
+          <p:cNvPr id="6" name="Slide Number Placeholder 5">
+            <a:extLst>
+              <a:ext uri="{FF2B5EF4-FFF2-40B4-BE49-F238E27FC236}">
+                <a16:creationId xmlns:a16="http://schemas.microsoft.com/office/drawing/2014/main" id="{357CAAC1-7226-31C6-C1CD-816ABCEE15AB}"/>
+              </a:ext>
+            </a:extLst>
+          </p:cNvPr>
+          <p:cNvSpPr>
+            <a:spLocks noGrp="1"/>
+          </p:cNvSpPr>
+          <p:nvPr>
+            <p:ph type="sldNum" sz="quarter" idx="12"/>
+          </p:nvPr>
+        </p:nvSpPr>
+        <p:spPr/>
+        <p:txBody>
+          <a:bodyPr/>
+          <a:lstStyle/>
+          <a:p>
+            <a:fld id="{55206F03-2227-42F5-B928-747E3D86FF23}" type="slidenum">
+              <a:rPr lang="en-US" sz="2800" b="1" smtClean="0"/>
+              <a:t>2</a:t>
+            </a:fld>
+            <a:endParaRPr lang="en-US" sz="2800" b="1" dirty="0"/>
+          </a:p>
+        </p:txBody>
+      </p:sp>
     </p:spTree>
     <p:extLst>
       <p:ext uri="{BB962C8B-B14F-4D97-AF65-F5344CB8AC3E}">
@@ -14596,6 +13884,35 @@
           </a:prstGeom>
         </p:spPr>
       </p:pic>
+      <p:sp>
+        <p:nvSpPr>
+          <p:cNvPr id="6" name="Slide Number Placeholder 5">
+            <a:extLst>
+              <a:ext uri="{FF2B5EF4-FFF2-40B4-BE49-F238E27FC236}">
+                <a16:creationId xmlns:a16="http://schemas.microsoft.com/office/drawing/2014/main" id="{5CC8CFDD-3D6B-B2BC-EB3E-D911FCEA9EAA}"/>
+              </a:ext>
+            </a:extLst>
+          </p:cNvPr>
+          <p:cNvSpPr>
+            <a:spLocks noGrp="1"/>
+          </p:cNvSpPr>
+          <p:nvPr>
+            <p:ph type="sldNum" sz="quarter" idx="12"/>
+          </p:nvPr>
+        </p:nvSpPr>
+        <p:spPr/>
+        <p:txBody>
+          <a:bodyPr/>
+          <a:lstStyle/>
+          <a:p>
+            <a:fld id="{55206F03-2227-42F5-B928-747E3D86FF23}" type="slidenum">
+              <a:rPr lang="en-US" sz="2800" b="1" smtClean="0"/>
+              <a:t>3</a:t>
+            </a:fld>
+            <a:endParaRPr lang="en-US" sz="2800" b="1" dirty="0"/>
+          </a:p>
+        </p:txBody>
+      </p:sp>
     </p:spTree>
     <p:extLst>
       <p:ext uri="{BB962C8B-B14F-4D97-AF65-F5344CB8AC3E}">
@@ -15187,6 +14504,35 @@
           </a:prstGeom>
         </p:spPr>
       </p:pic>
+      <p:sp>
+        <p:nvSpPr>
+          <p:cNvPr id="6" name="Slide Number Placeholder 5">
+            <a:extLst>
+              <a:ext uri="{FF2B5EF4-FFF2-40B4-BE49-F238E27FC236}">
+                <a16:creationId xmlns:a16="http://schemas.microsoft.com/office/drawing/2014/main" id="{78EACD56-2C8B-11F0-E651-7048F9EBEDE5}"/>
+              </a:ext>
+            </a:extLst>
+          </p:cNvPr>
+          <p:cNvSpPr>
+            <a:spLocks noGrp="1"/>
+          </p:cNvSpPr>
+          <p:nvPr>
+            <p:ph type="sldNum" sz="quarter" idx="12"/>
+          </p:nvPr>
+        </p:nvSpPr>
+        <p:spPr/>
+        <p:txBody>
+          <a:bodyPr/>
+          <a:lstStyle/>
+          <a:p>
+            <a:fld id="{55206F03-2227-42F5-B928-747E3D86FF23}" type="slidenum">
+              <a:rPr lang="en-US" smtClean="0"/>
+              <a:t>4</a:t>
+            </a:fld>
+            <a:endParaRPr lang="en-US" dirty="0"/>
+          </a:p>
+        </p:txBody>
+      </p:sp>
     </p:spTree>
     <p:extLst>
       <p:ext uri="{BB962C8B-B14F-4D97-AF65-F5344CB8AC3E}">
@@ -15816,6 +15162,35 @@
           </a:prstGeom>
         </p:spPr>
       </p:pic>
+      <p:sp>
+        <p:nvSpPr>
+          <p:cNvPr id="4" name="Slide Number Placeholder 3">
+            <a:extLst>
+              <a:ext uri="{FF2B5EF4-FFF2-40B4-BE49-F238E27FC236}">
+                <a16:creationId xmlns:a16="http://schemas.microsoft.com/office/drawing/2014/main" id="{B379941D-FCDF-0B22-204E-4FA25246BFAD}"/>
+              </a:ext>
+            </a:extLst>
+          </p:cNvPr>
+          <p:cNvSpPr>
+            <a:spLocks noGrp="1"/>
+          </p:cNvSpPr>
+          <p:nvPr>
+            <p:ph type="sldNum" sz="quarter" idx="12"/>
+          </p:nvPr>
+        </p:nvSpPr>
+        <p:spPr/>
+        <p:txBody>
+          <a:bodyPr/>
+          <a:lstStyle/>
+          <a:p>
+            <a:fld id="{55206F03-2227-42F5-B928-747E3D86FF23}" type="slidenum">
+              <a:rPr lang="en-US" smtClean="0"/>
+              <a:t>5</a:t>
+            </a:fld>
+            <a:endParaRPr lang="en-US"/>
+          </a:p>
+        </p:txBody>
+      </p:sp>
     </p:spTree>
     <p:extLst>
       <p:ext uri="{BB962C8B-B14F-4D97-AF65-F5344CB8AC3E}">
@@ -17191,6 +16566,35 @@
           </a:graphicData>
         </a:graphic>
       </p:graphicFrame>
+      <p:sp>
+        <p:nvSpPr>
+          <p:cNvPr id="6" name="Slide Number Placeholder 5">
+            <a:extLst>
+              <a:ext uri="{FF2B5EF4-FFF2-40B4-BE49-F238E27FC236}">
+                <a16:creationId xmlns:a16="http://schemas.microsoft.com/office/drawing/2014/main" id="{929A3CED-A809-79F6-CA37-78BCD0A7D22A}"/>
+              </a:ext>
+            </a:extLst>
+          </p:cNvPr>
+          <p:cNvSpPr>
+            <a:spLocks noGrp="1"/>
+          </p:cNvSpPr>
+          <p:nvPr>
+            <p:ph type="sldNum" sz="quarter" idx="12"/>
+          </p:nvPr>
+        </p:nvSpPr>
+        <p:spPr/>
+        <p:txBody>
+          <a:bodyPr/>
+          <a:lstStyle/>
+          <a:p>
+            <a:fld id="{55206F03-2227-42F5-B928-747E3D86FF23}" type="slidenum">
+              <a:rPr lang="en-US" smtClean="0"/>
+              <a:t>6</a:t>
+            </a:fld>
+            <a:endParaRPr lang="en-US"/>
+          </a:p>
+        </p:txBody>
+      </p:sp>
     </p:spTree>
     <p:extLst>
       <p:ext uri="{BB962C8B-B14F-4D97-AF65-F5344CB8AC3E}">
@@ -18512,6 +17916,35 @@
           </a:graphicData>
         </a:graphic>
       </p:graphicFrame>
+      <p:sp>
+        <p:nvSpPr>
+          <p:cNvPr id="6" name="Slide Number Placeholder 5">
+            <a:extLst>
+              <a:ext uri="{FF2B5EF4-FFF2-40B4-BE49-F238E27FC236}">
+                <a16:creationId xmlns:a16="http://schemas.microsoft.com/office/drawing/2014/main" id="{5203D2DC-7D03-42CB-E8F1-BE913DD16F09}"/>
+              </a:ext>
+            </a:extLst>
+          </p:cNvPr>
+          <p:cNvSpPr>
+            <a:spLocks noGrp="1"/>
+          </p:cNvSpPr>
+          <p:nvPr>
+            <p:ph type="sldNum" sz="quarter" idx="12"/>
+          </p:nvPr>
+        </p:nvSpPr>
+        <p:spPr/>
+        <p:txBody>
+          <a:bodyPr/>
+          <a:lstStyle/>
+          <a:p>
+            <a:fld id="{55206F03-2227-42F5-B928-747E3D86FF23}" type="slidenum">
+              <a:rPr lang="en-US" smtClean="0"/>
+              <a:t>7</a:t>
+            </a:fld>
+            <a:endParaRPr lang="en-US"/>
+          </a:p>
+        </p:txBody>
+      </p:sp>
     </p:spTree>
     <p:extLst>
       <p:ext uri="{BB962C8B-B14F-4D97-AF65-F5344CB8AC3E}">
@@ -19468,6 +18901,35 @@
           </a:graphicData>
         </a:graphic>
       </p:graphicFrame>
+      <p:sp>
+        <p:nvSpPr>
+          <p:cNvPr id="6" name="Slide Number Placeholder 5">
+            <a:extLst>
+              <a:ext uri="{FF2B5EF4-FFF2-40B4-BE49-F238E27FC236}">
+                <a16:creationId xmlns:a16="http://schemas.microsoft.com/office/drawing/2014/main" id="{406EDDE0-2506-AF23-C9A6-F804BF006227}"/>
+              </a:ext>
+            </a:extLst>
+          </p:cNvPr>
+          <p:cNvSpPr>
+            <a:spLocks noGrp="1"/>
+          </p:cNvSpPr>
+          <p:nvPr>
+            <p:ph type="sldNum" sz="quarter" idx="12"/>
+          </p:nvPr>
+        </p:nvSpPr>
+        <p:spPr/>
+        <p:txBody>
+          <a:bodyPr/>
+          <a:lstStyle/>
+          <a:p>
+            <a:fld id="{55206F03-2227-42F5-B928-747E3D86FF23}" type="slidenum">
+              <a:rPr lang="en-US" smtClean="0"/>
+              <a:t>8</a:t>
+            </a:fld>
+            <a:endParaRPr lang="en-US"/>
+          </a:p>
+        </p:txBody>
+      </p:sp>
     </p:spTree>
     <p:extLst>
       <p:ext uri="{BB962C8B-B14F-4D97-AF65-F5344CB8AC3E}">
@@ -20432,6 +19894,35 @@
           </a:graphicData>
         </a:graphic>
       </p:graphicFrame>
+      <p:sp>
+        <p:nvSpPr>
+          <p:cNvPr id="5" name="Slide Number Placeholder 4">
+            <a:extLst>
+              <a:ext uri="{FF2B5EF4-FFF2-40B4-BE49-F238E27FC236}">
+                <a16:creationId xmlns:a16="http://schemas.microsoft.com/office/drawing/2014/main" id="{48C19226-AECB-FF4A-96B2-C095B00E9DBE}"/>
+              </a:ext>
+            </a:extLst>
+          </p:cNvPr>
+          <p:cNvSpPr>
+            <a:spLocks noGrp="1"/>
+          </p:cNvSpPr>
+          <p:nvPr>
+            <p:ph type="sldNum" sz="quarter" idx="12"/>
+          </p:nvPr>
+        </p:nvSpPr>
+        <p:spPr/>
+        <p:txBody>
+          <a:bodyPr/>
+          <a:lstStyle/>
+          <a:p>
+            <a:fld id="{55206F03-2227-42F5-B928-747E3D86FF23}" type="slidenum">
+              <a:rPr lang="en-US" smtClean="0"/>
+              <a:t>9</a:t>
+            </a:fld>
+            <a:endParaRPr lang="en-US"/>
+          </a:p>
+        </p:txBody>
+      </p:sp>
     </p:spTree>
     <p:extLst>
       <p:ext uri="{BB962C8B-B14F-4D97-AF65-F5344CB8AC3E}">

</xml_diff>